<commit_message>
trivial fix on ppt
</commit_message>
<xml_diff>
--- a/sd_final_presentation.pptx
+++ b/sd_final_presentation.pptx
@@ -558,7 +558,7 @@
           <a:p>
             <a:fld id="{0D5F3D72-69AB-064B-A0B8-3C86021E59DC}" type="datetimeFigureOut">
               <a:rPr kumimoji="1" lang="ko-KR" altLang="en-US" smtClean="0"/>
-              <a:t>2025. 12. 4.</a:t>
+              <a:t>2025-12-09</a:t>
             </a:fld>
             <a:endParaRPr kumimoji="1" lang="ko-KR" altLang="en-US"/>
           </a:p>
@@ -756,7 +756,7 @@
           <a:p>
             <a:fld id="{0D5F3D72-69AB-064B-A0B8-3C86021E59DC}" type="datetimeFigureOut">
               <a:rPr kumimoji="1" lang="ko-KR" altLang="en-US" smtClean="0"/>
-              <a:t>2025. 12. 4.</a:t>
+              <a:t>2025-12-09</a:t>
             </a:fld>
             <a:endParaRPr kumimoji="1" lang="ko-KR" altLang="en-US"/>
           </a:p>
@@ -964,7 +964,7 @@
           <a:p>
             <a:fld id="{0D5F3D72-69AB-064B-A0B8-3C86021E59DC}" type="datetimeFigureOut">
               <a:rPr kumimoji="1" lang="ko-KR" altLang="en-US" smtClean="0"/>
-              <a:t>2025. 12. 4.</a:t>
+              <a:t>2025-12-09</a:t>
             </a:fld>
             <a:endParaRPr kumimoji="1" lang="ko-KR" altLang="en-US"/>
           </a:p>
@@ -1162,7 +1162,7 @@
           <a:p>
             <a:fld id="{0D5F3D72-69AB-064B-A0B8-3C86021E59DC}" type="datetimeFigureOut">
               <a:rPr kumimoji="1" lang="ko-KR" altLang="en-US" smtClean="0"/>
-              <a:t>2025. 12. 4.</a:t>
+              <a:t>2025-12-09</a:t>
             </a:fld>
             <a:endParaRPr kumimoji="1" lang="ko-KR" altLang="en-US"/>
           </a:p>
@@ -1437,7 +1437,7 @@
           <a:p>
             <a:fld id="{0D5F3D72-69AB-064B-A0B8-3C86021E59DC}" type="datetimeFigureOut">
               <a:rPr kumimoji="1" lang="ko-KR" altLang="en-US" smtClean="0"/>
-              <a:t>2025. 12. 4.</a:t>
+              <a:t>2025-12-09</a:t>
             </a:fld>
             <a:endParaRPr kumimoji="1" lang="ko-KR" altLang="en-US"/>
           </a:p>
@@ -1702,7 +1702,7 @@
           <a:p>
             <a:fld id="{0D5F3D72-69AB-064B-A0B8-3C86021E59DC}" type="datetimeFigureOut">
               <a:rPr kumimoji="1" lang="ko-KR" altLang="en-US" smtClean="0"/>
-              <a:t>2025. 12. 4.</a:t>
+              <a:t>2025-12-09</a:t>
             </a:fld>
             <a:endParaRPr kumimoji="1" lang="ko-KR" altLang="en-US"/>
           </a:p>
@@ -2114,7 +2114,7 @@
           <a:p>
             <a:fld id="{0D5F3D72-69AB-064B-A0B8-3C86021E59DC}" type="datetimeFigureOut">
               <a:rPr kumimoji="1" lang="ko-KR" altLang="en-US" smtClean="0"/>
-              <a:t>2025. 12. 4.</a:t>
+              <a:t>2025-12-09</a:t>
             </a:fld>
             <a:endParaRPr kumimoji="1" lang="ko-KR" altLang="en-US"/>
           </a:p>
@@ -2255,7 +2255,7 @@
           <a:p>
             <a:fld id="{0D5F3D72-69AB-064B-A0B8-3C86021E59DC}" type="datetimeFigureOut">
               <a:rPr kumimoji="1" lang="ko-KR" altLang="en-US" smtClean="0"/>
-              <a:t>2025. 12. 4.</a:t>
+              <a:t>2025-12-09</a:t>
             </a:fld>
             <a:endParaRPr kumimoji="1" lang="ko-KR" altLang="en-US"/>
           </a:p>
@@ -2368,7 +2368,7 @@
           <a:p>
             <a:fld id="{0D5F3D72-69AB-064B-A0B8-3C86021E59DC}" type="datetimeFigureOut">
               <a:rPr kumimoji="1" lang="ko-KR" altLang="en-US" smtClean="0"/>
-              <a:t>2025. 12. 4.</a:t>
+              <a:t>2025-12-09</a:t>
             </a:fld>
             <a:endParaRPr kumimoji="1" lang="ko-KR" altLang="en-US"/>
           </a:p>
@@ -2679,7 +2679,7 @@
           <a:p>
             <a:fld id="{0D5F3D72-69AB-064B-A0B8-3C86021E59DC}" type="datetimeFigureOut">
               <a:rPr kumimoji="1" lang="ko-KR" altLang="en-US" smtClean="0"/>
-              <a:t>2025. 12. 4.</a:t>
+              <a:t>2025-12-09</a:t>
             </a:fld>
             <a:endParaRPr kumimoji="1" lang="ko-KR" altLang="en-US"/>
           </a:p>
@@ -2967,7 +2967,7 @@
           <a:p>
             <a:fld id="{0D5F3D72-69AB-064B-A0B8-3C86021E59DC}" type="datetimeFigureOut">
               <a:rPr kumimoji="1" lang="ko-KR" altLang="en-US" smtClean="0"/>
-              <a:t>2025. 12. 4.</a:t>
+              <a:t>2025-12-09</a:t>
             </a:fld>
             <a:endParaRPr kumimoji="1" lang="ko-KR" altLang="en-US"/>
           </a:p>
@@ -3208,7 +3208,7 @@
           <a:p>
             <a:fld id="{0D5F3D72-69AB-064B-A0B8-3C86021E59DC}" type="datetimeFigureOut">
               <a:rPr kumimoji="1" lang="ko-KR" altLang="en-US" smtClean="0"/>
-              <a:t>2025. 12. 4.</a:t>
+              <a:t>2025-12-09</a:t>
             </a:fld>
             <a:endParaRPr kumimoji="1" lang="ko-KR" altLang="en-US"/>
           </a:p>
@@ -4788,12 +4788,20 @@
               <a:t>Co-surgeon </a:t>
             </a:r>
             <a:r>
-              <a:rPr lang="ko-KR" altLang="en-US" b="1" dirty="0" err="1">
+              <a:rPr lang="ko-KR" altLang="en-US" b="1" dirty="0">
                 <a:solidFill>
                   <a:schemeClr val="bg1"/>
                 </a:solidFill>
               </a:rPr>
-              <a:t>권동연</a:t>
+              <a:t>권동연 </a:t>
+            </a:r>
+            <a:r>
+              <a:rPr lang="en-US" altLang="ko-KR" b="1" dirty="0">
+                <a:solidFill>
+                  <a:schemeClr val="bg1"/>
+                </a:solidFill>
+              </a:rPr>
+              <a:t>with Claude AI</a:t>
             </a:r>
             <a:endParaRPr lang="ko-KR" altLang="en-US" b="1" dirty="0">
               <a:solidFill>
@@ -5832,11 +5840,11 @@
             </a:r>
             <a:r>
               <a:rPr lang="en-US" altLang="ko-KR" sz="1800" dirty="0"/>
-              <a:t>port</a:t>
+              <a:t>IP </a:t>
             </a:r>
             <a:r>
               <a:rPr lang="ko-KR" altLang="en-US" sz="1800" dirty="0"/>
-              <a:t>번호를 다르게 구성 </a:t>
+              <a:t>주소를 다르게 구성 </a:t>
             </a:r>
             <a:r>
               <a:rPr lang="en-US" altLang="ko-KR" sz="1800" dirty="0"/>
@@ -6372,7 +6380,7 @@
             </a:r>
             <a:r>
               <a:rPr lang="ko-KR" altLang="en-US" sz="1800" dirty="0"/>
-              <a:t>에서 </a:t>
+              <a:t>에서 각 </a:t>
             </a:r>
             <a:r>
               <a:rPr lang="en-US" altLang="ko-KR" sz="1800" dirty="0"/>

</xml_diff>